<commit_message>
modified:   ../data/disease.csv 	modified:   ../data/tissue_count.csv 	modified:   ../figures/disease_bar.png 	modified:   ../figures/tissue_count.png 	modified:   ../multi_panel/1.png 	modified:   ../multi_panel/multi_panel.pptx 	../figures/tissue_disease.png
</commit_message>
<xml_diff>
--- a/multi_panel/multi_panel.pptx
+++ b/multi_panel/multi_panel.pptx
@@ -3002,7 +3002,7 @@
         </p:blipFill>
         <p:spPr>
           <a:xfrm>
-            <a:off x="-968936" y="455604"/>
+            <a:off x="-1166155" y="455604"/>
             <a:ext cx="8833536" cy="4490876"/>
           </a:xfrm>
           <a:prstGeom prst="rect">
@@ -3038,8 +3038,8 @@
         </p:blipFill>
         <p:spPr>
           <a:xfrm>
-            <a:off x="8597516" y="1163512"/>
-            <a:ext cx="6354163" cy="3859167"/>
+            <a:off x="8237743" y="896667"/>
+            <a:ext cx="7394279" cy="4490876"/>
           </a:xfrm>
           <a:prstGeom prst="rect">
             <a:avLst/>
@@ -3074,7 +3074,7 @@
         </p:blipFill>
         <p:spPr>
           <a:xfrm>
-            <a:off x="715278" y="5193217"/>
+            <a:off x="518059" y="5193217"/>
             <a:ext cx="6772321" cy="4724644"/>
           </a:xfrm>
           <a:prstGeom prst="rect">
@@ -3110,7 +3110,7 @@
         </p:blipFill>
         <p:spPr>
           <a:xfrm>
-            <a:off x="8540367" y="5333756"/>
+            <a:off x="8343148" y="5333756"/>
             <a:ext cx="6354163" cy="4724644"/>
           </a:xfrm>
           <a:prstGeom prst="rect">
@@ -3132,7 +3132,7 @@
         </p:nvSpPr>
         <p:spPr>
           <a:xfrm>
-            <a:off x="748700" y="996658"/>
+            <a:off x="551481" y="996658"/>
             <a:ext cx="311304" cy="400110"/>
           </a:xfrm>
           <a:prstGeom prst="rect">
@@ -3167,7 +3167,7 @@
         </p:nvSpPr>
         <p:spPr>
           <a:xfrm>
-            <a:off x="8245088" y="996658"/>
+            <a:off x="8047869" y="996658"/>
             <a:ext cx="322524" cy="400110"/>
           </a:xfrm>
           <a:prstGeom prst="rect">
@@ -3202,7 +3202,7 @@
         </p:nvSpPr>
         <p:spPr>
           <a:xfrm>
-            <a:off x="8245088" y="5850963"/>
+            <a:off x="8047869" y="5850963"/>
             <a:ext cx="322524" cy="400110"/>
           </a:xfrm>
           <a:prstGeom prst="rect">
@@ -3237,7 +3237,7 @@
         </p:nvSpPr>
         <p:spPr>
           <a:xfrm>
-            <a:off x="748700" y="5850963"/>
+            <a:off x="551481" y="5850963"/>
             <a:ext cx="292068" cy="400110"/>
           </a:xfrm>
           <a:prstGeom prst="rect">
@@ -5441,7 +5441,7 @@
                     <a:p>
                       <a:pPr algn="r" fontAlgn="b"/>
                       <a:r>
-                        <a:rPr lang="en-US" sz="1100" b="0" i="0" u="none" strike="noStrike">
+                        <a:rPr lang="en-US" sz="1100" b="0" i="0" u="none" strike="noStrike" dirty="0">
                           <a:solidFill>
                             <a:srgbClr val="000000"/>
                           </a:solidFill>

</xml_diff>